<commit_message>
ADD -power point presentation content
</commit_message>
<xml_diff>
--- a/presentation.pptx
+++ b/presentation.pptx
@@ -4357,10 +4357,129 @@
           <a:bodyPr/>
           <a:lstStyle/>
           <a:p>
-            <a:endParaRPr lang="en-US"/>
-          </a:p>
-        </p:txBody>
-      </p:sp>
+            <a:pPr marL="91440" indent="-91440" algn="l" defTabSz="914400" rtl="0" eaLnBrk="1" latinLnBrk="0" hangingPunct="1">
+              <a:lnSpc>
+                <a:spcPct val="90000"/>
+              </a:lnSpc>
+              <a:spcBef>
+                <a:spcPts val="1200"/>
+              </a:spcBef>
+              <a:spcAft>
+                <a:spcPts val="200"/>
+              </a:spcAft>
+              <a:buClr>
+                <a:schemeClr val="accent1"/>
+              </a:buClr>
+              <a:buSzPct val="100000"/>
+              <a:buFont typeface="Calibri" panose="020F0502020204030204" pitchFamily="34" charset="0"/>
+              <a:buChar char=" "/>
+            </a:pPr>
+            <a:r>
+              <a:rPr lang="en-US" dirty="0"/>
+              <a:t>To find a sub-set of constant size that will give the most bugs </a:t>
+            </a:r>
+          </a:p>
+          <a:p>
+            <a:pPr marL="91440" indent="-91440" algn="l" defTabSz="914400" rtl="0" eaLnBrk="1" latinLnBrk="0" hangingPunct="1">
+              <a:lnSpc>
+                <a:spcPct val="90000"/>
+              </a:lnSpc>
+              <a:spcBef>
+                <a:spcPts val="1200"/>
+              </a:spcBef>
+              <a:spcAft>
+                <a:spcPts val="200"/>
+              </a:spcAft>
+              <a:buClr>
+                <a:schemeClr val="accent1"/>
+              </a:buClr>
+              <a:buSzPct val="100000"/>
+              <a:buFont typeface="Calibri" panose="020F0502020204030204" pitchFamily="34" charset="0"/>
+              <a:buChar char=" "/>
+            </a:pPr>
+            <a:r>
+              <a:rPr lang="en-US" dirty="0"/>
+              <a:t>In the sub set</a:t>
+            </a:r>
+          </a:p>
+          <a:p>
+            <a:pPr marL="91440" indent="-91440" algn="l" defTabSz="914400" rtl="0" eaLnBrk="1" latinLnBrk="0" hangingPunct="1">
+              <a:lnSpc>
+                <a:spcPct val="90000"/>
+              </a:lnSpc>
+              <a:spcBef>
+                <a:spcPts val="1200"/>
+              </a:spcBef>
+              <a:spcAft>
+                <a:spcPts val="200"/>
+              </a:spcAft>
+              <a:buClr>
+                <a:schemeClr val="accent1"/>
+              </a:buClr>
+              <a:buSzPct val="100000"/>
+              <a:buFont typeface="Calibri" panose="020F0502020204030204" pitchFamily="34" charset="0"/>
+              <a:buChar char=" "/>
+            </a:pPr>
+            <a:endParaRPr lang="en-US" dirty="0"/>
+          </a:p>
+          <a:p>
+            <a:pPr marL="91440" indent="-91440" algn="l" defTabSz="914400" rtl="0" eaLnBrk="1" latinLnBrk="0" hangingPunct="1">
+              <a:lnSpc>
+                <a:spcPct val="90000"/>
+              </a:lnSpc>
+              <a:spcBef>
+                <a:spcPts val="1200"/>
+              </a:spcBef>
+              <a:spcAft>
+                <a:spcPts val="200"/>
+              </a:spcAft>
+              <a:buClr>
+                <a:schemeClr val="accent1"/>
+              </a:buClr>
+              <a:buSzPct val="100000"/>
+              <a:buFont typeface="Calibri" panose="020F0502020204030204" pitchFamily="34" charset="0"/>
+              <a:buChar char=" "/>
+            </a:pPr>
+            <a:endParaRPr lang="en-US" dirty="0"/>
+          </a:p>
+        </p:txBody>
+      </p:sp>
+      <p:pic>
+        <p:nvPicPr>
+          <p:cNvPr id="4" name="Content Placeholder 4">
+            <a:extLst>
+              <a:ext uri="{FF2B5EF4-FFF2-40B4-BE49-F238E27FC236}">
+                <a16:creationId xmlns:a16="http://schemas.microsoft.com/office/drawing/2014/main" id="{910E7538-8B62-9C4C-B6DA-0AB9F37A9919}"/>
+              </a:ext>
+            </a:extLst>
+          </p:cNvPr>
+          <p:cNvPicPr>
+            <a:picLocks noChangeAspect="1"/>
+          </p:cNvPicPr>
+          <p:nvPr/>
+        </p:nvPicPr>
+        <p:blipFill>
+          <a:blip r:embed="rId2">
+            <a:extLst>
+              <a:ext uri="{28A0092B-C50C-407E-A947-70E740481C1C}">
+                <a14:useLocalDpi xmlns:a14="http://schemas.microsoft.com/office/drawing/2010/main" val="0"/>
+              </a:ext>
+            </a:extLst>
+          </a:blip>
+          <a:stretch>
+            <a:fillRect/>
+          </a:stretch>
+        </p:blipFill>
+        <p:spPr>
+          <a:xfrm>
+            <a:off x="7540409" y="1845734"/>
+            <a:ext cx="3492943" cy="2628077"/>
+          </a:xfrm>
+          <a:prstGeom prst="rect">
+            <a:avLst/>
+          </a:prstGeom>
+        </p:spPr>
+      </p:pic>
     </p:spTree>
     <p:extLst>
       <p:ext uri="{BB962C8B-B14F-4D97-AF65-F5344CB8AC3E}">
@@ -4430,10 +4549,10 @@
       </p:sp>
       <p:sp>
         <p:nvSpPr>
-          <p:cNvPr id="3" name="Content Placeholder 2">
+          <p:cNvPr id="6" name="Content Placeholder 5">
             <a:extLst>
               <a:ext uri="{FF2B5EF4-FFF2-40B4-BE49-F238E27FC236}">
-                <a16:creationId xmlns:a16="http://schemas.microsoft.com/office/drawing/2014/main" id="{6D4E2CA8-CF9D-704C-8E53-76022115D3E9}"/>
+                <a16:creationId xmlns:a16="http://schemas.microsoft.com/office/drawing/2014/main" id="{6AAE6D68-C992-C647-A0FE-E8C06C7C87D2}"/>
               </a:ext>
             </a:extLst>
           </p:cNvPr>
@@ -4449,7 +4568,153 @@
           <a:bodyPr/>
           <a:lstStyle/>
           <a:p>
-            <a:endParaRPr lang="en-US"/>
+            <a:pPr marL="91440" indent="-91440" algn="l" defTabSz="914400" rtl="0" eaLnBrk="1" latinLnBrk="0" hangingPunct="1">
+              <a:lnSpc>
+                <a:spcPct val="90000"/>
+              </a:lnSpc>
+              <a:spcBef>
+                <a:spcPts val="1200"/>
+              </a:spcBef>
+              <a:spcAft>
+                <a:spcPts val="200"/>
+              </a:spcAft>
+              <a:buClr>
+                <a:schemeClr val="accent1"/>
+              </a:buClr>
+              <a:buSzPct val="100000"/>
+              <a:buFont typeface="Calibri" panose="020F0502020204030204" pitchFamily="34" charset="0"/>
+              <a:buChar char=" "/>
+            </a:pPr>
+            <a:endParaRPr lang="en-US" dirty="0"/>
+          </a:p>
+          <a:p>
+            <a:pPr marL="91440" indent="-91440" algn="l" defTabSz="914400" rtl="0" eaLnBrk="1" latinLnBrk="0" hangingPunct="1">
+              <a:lnSpc>
+                <a:spcPct val="90000"/>
+              </a:lnSpc>
+              <a:spcBef>
+                <a:spcPts val="1200"/>
+              </a:spcBef>
+              <a:spcAft>
+                <a:spcPts val="200"/>
+              </a:spcAft>
+              <a:buClr>
+                <a:schemeClr val="accent1"/>
+              </a:buClr>
+              <a:buSzPct val="100000"/>
+              <a:buFont typeface="Calibri" panose="020F0502020204030204" pitchFamily="34" charset="0"/>
+              <a:buChar char=" "/>
+            </a:pPr>
+            <a:r>
+              <a:rPr lang="en-US" dirty="0"/>
+              <a:t>Diagnostic algorithm that simulates the the test for a given state and updates the fail probability for each component in the given test</a:t>
+            </a:r>
+          </a:p>
+          <a:p>
+            <a:pPr marL="91440" indent="-91440" algn="l" defTabSz="914400" rtl="0" eaLnBrk="1" latinLnBrk="0" hangingPunct="1">
+              <a:lnSpc>
+                <a:spcPct val="90000"/>
+              </a:lnSpc>
+              <a:spcBef>
+                <a:spcPts val="1200"/>
+              </a:spcBef>
+              <a:spcAft>
+                <a:spcPts val="200"/>
+              </a:spcAft>
+              <a:buClr>
+                <a:schemeClr val="accent1"/>
+              </a:buClr>
+              <a:buSzPct val="100000"/>
+              <a:buFont typeface="Calibri" panose="020F0502020204030204" pitchFamily="34" charset="0"/>
+              <a:buChar char=" "/>
+            </a:pPr>
+            <a:endParaRPr lang="en-US" dirty="0"/>
+          </a:p>
+          <a:p>
+            <a:pPr marL="91440" indent="-91440" algn="l" defTabSz="914400" rtl="0" eaLnBrk="1" latinLnBrk="0" hangingPunct="1">
+              <a:lnSpc>
+                <a:spcPct val="90000"/>
+              </a:lnSpc>
+              <a:spcBef>
+                <a:spcPts val="1200"/>
+              </a:spcBef>
+              <a:spcAft>
+                <a:spcPts val="200"/>
+              </a:spcAft>
+              <a:buClr>
+                <a:schemeClr val="accent1"/>
+              </a:buClr>
+              <a:buSzPct val="100000"/>
+              <a:buFont typeface="Calibri" panose="020F0502020204030204" pitchFamily="34" charset="0"/>
+              <a:buChar char=" "/>
+            </a:pPr>
+            <a:r>
+              <a:rPr lang="en-US" dirty="0"/>
+              <a:t>Optimizer algorithm that is based on Information gain logic to find the subset with the most </a:t>
+            </a:r>
+          </a:p>
+          <a:p>
+            <a:pPr marL="91440" indent="-91440" algn="l" defTabSz="914400" rtl="0" eaLnBrk="1" latinLnBrk="0" hangingPunct="1">
+              <a:lnSpc>
+                <a:spcPct val="90000"/>
+              </a:lnSpc>
+              <a:spcBef>
+                <a:spcPts val="1200"/>
+              </a:spcBef>
+              <a:spcAft>
+                <a:spcPts val="200"/>
+              </a:spcAft>
+              <a:buClr>
+                <a:schemeClr val="accent1"/>
+              </a:buClr>
+              <a:buSzPct val="100000"/>
+              <a:buFont typeface="Calibri" panose="020F0502020204030204" pitchFamily="34" charset="0"/>
+              <a:buChar char=" "/>
+            </a:pPr>
+            <a:endParaRPr lang="en-US" dirty="0"/>
+          </a:p>
+          <a:p>
+            <a:pPr marL="91440" indent="-91440" algn="l" defTabSz="914400" rtl="0" eaLnBrk="1" latinLnBrk="0" hangingPunct="1">
+              <a:lnSpc>
+                <a:spcPct val="90000"/>
+              </a:lnSpc>
+              <a:spcBef>
+                <a:spcPts val="1200"/>
+              </a:spcBef>
+              <a:spcAft>
+                <a:spcPts val="200"/>
+              </a:spcAft>
+              <a:buClr>
+                <a:schemeClr val="accent1"/>
+              </a:buClr>
+              <a:buSzPct val="100000"/>
+              <a:buFont typeface="Calibri" panose="020F0502020204030204" pitchFamily="34" charset="0"/>
+              <a:buChar char=" "/>
+            </a:pPr>
+            <a:r>
+              <a:rPr lang="en-US"/>
+              <a:t>Information gain</a:t>
+            </a:r>
+          </a:p>
+          <a:p>
+            <a:pPr marL="91440" indent="-91440" algn="l" defTabSz="914400" rtl="0" eaLnBrk="1" latinLnBrk="0" hangingPunct="1">
+              <a:lnSpc>
+                <a:spcPct val="90000"/>
+              </a:lnSpc>
+              <a:spcBef>
+                <a:spcPts val="1200"/>
+              </a:spcBef>
+              <a:spcAft>
+                <a:spcPts val="200"/>
+              </a:spcAft>
+              <a:buClr>
+                <a:schemeClr val="accent1"/>
+              </a:buClr>
+              <a:buSzPct val="100000"/>
+              <a:buFont typeface="Calibri" panose="020F0502020204030204" pitchFamily="34" charset="0"/>
+              <a:buChar char=" "/>
+            </a:pPr>
+            <a:endParaRPr lang="en-US" dirty="0"/>
           </a:p>
         </p:txBody>
       </p:sp>

</xml_diff>